<commit_message>
Update docker architect document
Signed-off-by: Liu Haixiang <haixiang1977@gmail.com>
</commit_message>
<xml_diff>
--- a/Docker architect.pptx
+++ b/Docker architect.pptx
@@ -13,6 +13,7 @@
     <p:sldId id="262" r:id="rId7"/>
     <p:sldId id="261" r:id="rId8"/>
     <p:sldId id="263" r:id="rId9"/>
+    <p:sldId id="264" r:id="rId10"/>
   </p:sldIdLst>
   <p:sldSz cx="12192000" cy="6858000"/>
   <p:notesSz cx="6858000" cy="9144000"/>
@@ -111,6 +112,11 @@
       </a:defRPr>
     </a:lvl9pPr>
   </p:defaultTextStyle>
+  <p:extLst>
+    <p:ext uri="{EFAFB233-063F-42B5-8137-9DF3F51BA10A}">
+      <p15:sldGuideLst xmlns:p15="http://schemas.microsoft.com/office/powerpoint/2012/main"/>
+    </p:ext>
+  </p:extLst>
 </p:presentation>
 </file>
 
@@ -285,7 +291,7 @@
           <a:p>
             <a:fld id="{48A87A34-81AB-432B-8DAE-1953F412C126}" type="datetimeFigureOut">
               <a:rPr lang="en-US" dirty="0"/>
-              <a:t>5/26/2020</a:t>
+              <a:t>5/27/2020</a:t>
             </a:fld>
             <a:endParaRPr lang="en-US" dirty="0"/>
           </a:p>
@@ -592,7 +598,7 @@
           <a:p>
             <a:fld id="{48A87A34-81AB-432B-8DAE-1953F412C126}" type="datetimeFigureOut">
               <a:rPr lang="en-US" dirty="0"/>
-              <a:t>5/26/2020</a:t>
+              <a:t>5/27/2020</a:t>
             </a:fld>
             <a:endParaRPr lang="en-US" dirty="0"/>
           </a:p>
@@ -809,7 +815,7 @@
           <a:p>
             <a:fld id="{48A87A34-81AB-432B-8DAE-1953F412C126}" type="datetimeFigureOut">
               <a:rPr lang="en-US" dirty="0"/>
-              <a:t>5/26/2020</a:t>
+              <a:t>5/27/2020</a:t>
             </a:fld>
             <a:endParaRPr lang="en-US" dirty="0"/>
           </a:p>
@@ -1095,7 +1101,7 @@
           <a:p>
             <a:fld id="{48A87A34-81AB-432B-8DAE-1953F412C126}" type="datetimeFigureOut">
               <a:rPr lang="en-US" dirty="0"/>
-              <a:t>5/26/2020</a:t>
+              <a:t>5/27/2020</a:t>
             </a:fld>
             <a:endParaRPr lang="en-US" dirty="0"/>
           </a:p>
@@ -1544,7 +1550,7 @@
           <a:p>
             <a:fld id="{48A87A34-81AB-432B-8DAE-1953F412C126}" type="datetimeFigureOut">
               <a:rPr lang="en-US" dirty="0"/>
-              <a:t>5/26/2020</a:t>
+              <a:t>5/27/2020</a:t>
             </a:fld>
             <a:endParaRPr lang="en-US" dirty="0"/>
           </a:p>
@@ -2115,7 +2121,7 @@
           <a:p>
             <a:fld id="{48A87A34-81AB-432B-8DAE-1953F412C126}" type="datetimeFigureOut">
               <a:rPr lang="en-US" dirty="0"/>
-              <a:t>5/26/2020</a:t>
+              <a:t>5/27/2020</a:t>
             </a:fld>
             <a:endParaRPr lang="en-US" dirty="0"/>
           </a:p>
@@ -2962,7 +2968,7 @@
           <a:p>
             <a:fld id="{48A87A34-81AB-432B-8DAE-1953F412C126}" type="datetimeFigureOut">
               <a:rPr lang="en-US" dirty="0"/>
-              <a:t>5/26/2020</a:t>
+              <a:t>5/27/2020</a:t>
             </a:fld>
             <a:endParaRPr lang="en-US" dirty="0"/>
           </a:p>
@@ -3162,7 +3168,7 @@
           <a:p>
             <a:fld id="{48A87A34-81AB-432B-8DAE-1953F412C126}" type="datetimeFigureOut">
               <a:rPr lang="en-US" dirty="0"/>
-              <a:t>5/26/2020</a:t>
+              <a:t>5/27/2020</a:t>
             </a:fld>
             <a:endParaRPr lang="en-US" dirty="0"/>
           </a:p>
@@ -3371,7 +3377,7 @@
           <a:p>
             <a:fld id="{48A87A34-81AB-432B-8DAE-1953F412C126}" type="datetimeFigureOut">
               <a:rPr lang="en-US" dirty="0"/>
-              <a:t>5/26/2020</a:t>
+              <a:t>5/27/2020</a:t>
             </a:fld>
             <a:endParaRPr lang="en-US" dirty="0"/>
           </a:p>
@@ -3571,7 +3577,7 @@
           <a:p>
             <a:fld id="{48A87A34-81AB-432B-8DAE-1953F412C126}" type="datetimeFigureOut">
               <a:rPr lang="en-US" dirty="0"/>
-              <a:t>5/26/2020</a:t>
+              <a:t>5/27/2020</a:t>
             </a:fld>
             <a:endParaRPr lang="en-US" dirty="0"/>
           </a:p>
@@ -3846,7 +3852,7 @@
           <a:p>
             <a:fld id="{48A87A34-81AB-432B-8DAE-1953F412C126}" type="datetimeFigureOut">
               <a:rPr lang="en-US" dirty="0"/>
-              <a:t>5/26/2020</a:t>
+              <a:t>5/27/2020</a:t>
             </a:fld>
             <a:endParaRPr lang="en-US" dirty="0"/>
           </a:p>
@@ -4108,7 +4114,7 @@
           <a:p>
             <a:fld id="{48A87A34-81AB-432B-8DAE-1953F412C126}" type="datetimeFigureOut">
               <a:rPr lang="en-US" dirty="0"/>
-              <a:t>5/26/2020</a:t>
+              <a:t>5/27/2020</a:t>
             </a:fld>
             <a:endParaRPr lang="en-US" dirty="0"/>
           </a:p>
@@ -4518,7 +4524,7 @@
           <a:p>
             <a:fld id="{48A87A34-81AB-432B-8DAE-1953F412C126}" type="datetimeFigureOut">
               <a:rPr lang="en-US" dirty="0"/>
-              <a:t>5/26/2020</a:t>
+              <a:t>5/27/2020</a:t>
             </a:fld>
             <a:endParaRPr lang="en-US" dirty="0"/>
           </a:p>
@@ -4661,7 +4667,7 @@
           <a:p>
             <a:fld id="{48A87A34-81AB-432B-8DAE-1953F412C126}" type="datetimeFigureOut">
               <a:rPr lang="en-US" dirty="0"/>
-              <a:t>5/26/2020</a:t>
+              <a:t>5/27/2020</a:t>
             </a:fld>
             <a:endParaRPr lang="en-US" dirty="0"/>
           </a:p>
@@ -4781,7 +4787,7 @@
           <a:p>
             <a:fld id="{48A87A34-81AB-432B-8DAE-1953F412C126}" type="datetimeFigureOut">
               <a:rPr lang="en-US" dirty="0"/>
-              <a:t>5/26/2020</a:t>
+              <a:t>5/27/2020</a:t>
             </a:fld>
             <a:endParaRPr lang="en-US" dirty="0"/>
           </a:p>
@@ -5055,7 +5061,7 @@
           <a:p>
             <a:fld id="{48A87A34-81AB-432B-8DAE-1953F412C126}" type="datetimeFigureOut">
               <a:rPr lang="en-US" dirty="0"/>
-              <a:t>5/26/2020</a:t>
+              <a:t>5/27/2020</a:t>
             </a:fld>
             <a:endParaRPr lang="en-US" dirty="0"/>
           </a:p>
@@ -5362,7 +5368,7 @@
           <a:p>
             <a:fld id="{48A87A34-81AB-432B-8DAE-1953F412C126}" type="datetimeFigureOut">
               <a:rPr lang="en-US" dirty="0"/>
-              <a:t>5/26/2020</a:t>
+              <a:t>5/27/2020</a:t>
             </a:fld>
             <a:endParaRPr lang="en-US" dirty="0"/>
           </a:p>
@@ -5611,7 +5617,7 @@
             <a:fld id="{48A87A34-81AB-432B-8DAE-1953F412C126}" type="datetimeFigureOut">
               <a:rPr lang="en-US" dirty="0"/>
               <a:pPr/>
-              <a:t>5/26/2020</a:t>
+              <a:t>5/27/2020</a:t>
             </a:fld>
             <a:endParaRPr lang="en-US" dirty="0"/>
           </a:p>
@@ -7262,11 +7268,38 @@
             </a:r>
             <a:r>
               <a:rPr lang="en-US" dirty="0"/>
-              <a:t> eclipse-</a:t>
+              <a:t> eclipse-mosquito</a:t>
+            </a:r>
+          </a:p>
+          <a:p>
+            <a:pPr lvl="1"/>
+            <a:endParaRPr lang="en-US" dirty="0"/>
+          </a:p>
+          <a:p>
+            <a:pPr lvl="1"/>
+            <a:endParaRPr lang="en-US" dirty="0"/>
+          </a:p>
+          <a:p>
+            <a:pPr lvl="1"/>
+            <a:endParaRPr lang="en-US" dirty="0"/>
+          </a:p>
+          <a:p>
+            <a:pPr lvl="1"/>
+            <a:endParaRPr lang="en-US" dirty="0"/>
+          </a:p>
+          <a:p>
+            <a:pPr lvl="1"/>
+            <a:endParaRPr lang="en-US" dirty="0"/>
+          </a:p>
+          <a:p>
+            <a:pPr lvl="1"/>
+            <a:r>
+              <a:rPr lang="en-US" dirty="0"/>
+              <a:t>Next time, docker start </a:t>
             </a:r>
             <a:r>
               <a:rPr lang="en-US" dirty="0" err="1"/>
-              <a:t>mosquitto</a:t>
+              <a:t>container_id</a:t>
             </a:r>
             <a:endParaRPr lang="en-US" dirty="0"/>
           </a:p>
@@ -7595,6 +7628,36 @@
           </a:p>
         </p:txBody>
       </p:sp>
+      <p:pic>
+        <p:nvPicPr>
+          <p:cNvPr id="4" name="Picture 3">
+            <a:extLst>
+              <a:ext uri="{FF2B5EF4-FFF2-40B4-BE49-F238E27FC236}">
+                <a16:creationId xmlns:a16="http://schemas.microsoft.com/office/drawing/2014/main" id="{782A0251-55A5-4C63-A535-50256C976535}"/>
+              </a:ext>
+            </a:extLst>
+          </p:cNvPr>
+          <p:cNvPicPr>
+            <a:picLocks noChangeAspect="1"/>
+          </p:cNvPicPr>
+          <p:nvPr/>
+        </p:nvPicPr>
+        <p:blipFill>
+          <a:blip r:embed="rId4"/>
+          <a:stretch>
+            <a:fillRect/>
+          </a:stretch>
+        </p:blipFill>
+        <p:spPr>
+          <a:xfrm>
+            <a:off x="1260630" y="3826023"/>
+            <a:ext cx="7732450" cy="2811800"/>
+          </a:xfrm>
+          <a:prstGeom prst="rect">
+            <a:avLst/>
+          </a:prstGeom>
+        </p:spPr>
+      </p:pic>
     </p:spTree>
     <p:extLst>
       <p:ext uri="{BB962C8B-B14F-4D97-AF65-F5344CB8AC3E}">
@@ -7712,6 +7775,197 @@
     <p:extLst>
       <p:ext uri="{BB962C8B-B14F-4D97-AF65-F5344CB8AC3E}">
         <p14:creationId xmlns:p14="http://schemas.microsoft.com/office/powerpoint/2010/main" val="3411478289"/>
+      </p:ext>
+    </p:extLst>
+  </p:cSld>
+  <p:clrMapOvr>
+    <a:masterClrMapping/>
+  </p:clrMapOvr>
+</p:sld>
+</file>
+
+<file path=ppt/slides/slide9.xml><?xml version="1.0" encoding="utf-8"?>
+<p:sld xmlns:a="http://schemas.openxmlformats.org/drawingml/2006/main" xmlns:r="http://schemas.openxmlformats.org/officeDocument/2006/relationships" xmlns:p="http://schemas.openxmlformats.org/presentationml/2006/main">
+  <p:cSld>
+    <p:spTree>
+      <p:nvGrpSpPr>
+        <p:cNvPr id="1" name=""/>
+        <p:cNvGrpSpPr/>
+        <p:nvPr/>
+      </p:nvGrpSpPr>
+      <p:grpSpPr>
+        <a:xfrm>
+          <a:off x="0" y="0"/>
+          <a:ext cx="0" cy="0"/>
+          <a:chOff x="0" y="0"/>
+          <a:chExt cx="0" cy="0"/>
+        </a:xfrm>
+      </p:grpSpPr>
+      <p:sp>
+        <p:nvSpPr>
+          <p:cNvPr id="2" name="Title 1">
+            <a:extLst>
+              <a:ext uri="{FF2B5EF4-FFF2-40B4-BE49-F238E27FC236}">
+                <a16:creationId xmlns:a16="http://schemas.microsoft.com/office/drawing/2014/main" id="{0A5C8AF0-AE20-4A78-AD40-A00BF09C2D8C}"/>
+              </a:ext>
+            </a:extLst>
+          </p:cNvPr>
+          <p:cNvSpPr>
+            <a:spLocks noGrp="1"/>
+          </p:cNvSpPr>
+          <p:nvPr>
+            <p:ph type="title"/>
+          </p:nvPr>
+        </p:nvSpPr>
+        <p:spPr/>
+        <p:txBody>
+          <a:bodyPr/>
+          <a:lstStyle/>
+          <a:p>
+            <a:r>
+              <a:rPr lang="en-US" dirty="0"/>
+              <a:t>Hyacinth (cont.)</a:t>
+            </a:r>
+          </a:p>
+        </p:txBody>
+      </p:sp>
+      <p:sp>
+        <p:nvSpPr>
+          <p:cNvPr id="3" name="Content Placeholder 2">
+            <a:extLst>
+              <a:ext uri="{FF2B5EF4-FFF2-40B4-BE49-F238E27FC236}">
+                <a16:creationId xmlns:a16="http://schemas.microsoft.com/office/drawing/2014/main" id="{BD043FF7-2A54-4054-B03A-929DE77779AA}"/>
+              </a:ext>
+            </a:extLst>
+          </p:cNvPr>
+          <p:cNvSpPr>
+            <a:spLocks noGrp="1"/>
+          </p:cNvSpPr>
+          <p:nvPr>
+            <p:ph sz="quarter" idx="13"/>
+          </p:nvPr>
+        </p:nvSpPr>
+        <p:spPr/>
+        <p:txBody>
+          <a:bodyPr/>
+          <a:lstStyle/>
+          <a:p>
+            <a:r>
+              <a:rPr lang="en-US" dirty="0"/>
+              <a:t>Run image and link to mosquito container</a:t>
+            </a:r>
+          </a:p>
+          <a:p>
+            <a:pPr lvl="1"/>
+            <a:r>
+              <a:rPr lang="en-US" dirty="0"/>
+              <a:t>docker run --name hyacinth --link </a:t>
+            </a:r>
+            <a:r>
+              <a:rPr lang="en-US" dirty="0" err="1"/>
+              <a:t>mosquitto</a:t>
+            </a:r>
+            <a:r>
+              <a:rPr lang="en-US" dirty="0"/>
+              <a:t> yiyang2009/hyacinth:1.1.0</a:t>
+            </a:r>
+          </a:p>
+        </p:txBody>
+      </p:sp>
+      <p:pic>
+        <p:nvPicPr>
+          <p:cNvPr id="4" name="Picture 3">
+            <a:extLst>
+              <a:ext uri="{FF2B5EF4-FFF2-40B4-BE49-F238E27FC236}">
+                <a16:creationId xmlns:a16="http://schemas.microsoft.com/office/drawing/2014/main" id="{E6857543-9926-4D8D-8B8A-08E0D53EAF33}"/>
+              </a:ext>
+            </a:extLst>
+          </p:cNvPr>
+          <p:cNvPicPr>
+            <a:picLocks noChangeAspect="1"/>
+          </p:cNvPicPr>
+          <p:nvPr/>
+        </p:nvPicPr>
+        <p:blipFill>
+          <a:blip r:embed="rId2"/>
+          <a:stretch>
+            <a:fillRect/>
+          </a:stretch>
+        </p:blipFill>
+        <p:spPr>
+          <a:xfrm>
+            <a:off x="1477207" y="3286125"/>
+            <a:ext cx="8953500" cy="285750"/>
+          </a:xfrm>
+          <a:prstGeom prst="rect">
+            <a:avLst/>
+          </a:prstGeom>
+        </p:spPr>
+      </p:pic>
+      <p:pic>
+        <p:nvPicPr>
+          <p:cNvPr id="5" name="Picture 4">
+            <a:extLst>
+              <a:ext uri="{FF2B5EF4-FFF2-40B4-BE49-F238E27FC236}">
+                <a16:creationId xmlns:a16="http://schemas.microsoft.com/office/drawing/2014/main" id="{C56E8468-93BA-4220-910C-526EE716B1A7}"/>
+              </a:ext>
+            </a:extLst>
+          </p:cNvPr>
+          <p:cNvPicPr>
+            <a:picLocks noChangeAspect="1"/>
+          </p:cNvPicPr>
+          <p:nvPr/>
+        </p:nvPicPr>
+        <p:blipFill>
+          <a:blip r:embed="rId3"/>
+          <a:stretch>
+            <a:fillRect/>
+          </a:stretch>
+        </p:blipFill>
+        <p:spPr>
+          <a:xfrm>
+            <a:off x="1477207" y="3822030"/>
+            <a:ext cx="10629530" cy="668878"/>
+          </a:xfrm>
+          <a:prstGeom prst="rect">
+            <a:avLst/>
+          </a:prstGeom>
+        </p:spPr>
+      </p:pic>
+      <p:pic>
+        <p:nvPicPr>
+          <p:cNvPr id="6" name="Picture 5">
+            <a:extLst>
+              <a:ext uri="{FF2B5EF4-FFF2-40B4-BE49-F238E27FC236}">
+                <a16:creationId xmlns:a16="http://schemas.microsoft.com/office/drawing/2014/main" id="{51F5081E-674E-4180-AC94-1F89904A45ED}"/>
+              </a:ext>
+            </a:extLst>
+          </p:cNvPr>
+          <p:cNvPicPr>
+            <a:picLocks noChangeAspect="1"/>
+          </p:cNvPicPr>
+          <p:nvPr/>
+        </p:nvPicPr>
+        <p:blipFill>
+          <a:blip r:embed="rId4"/>
+          <a:stretch>
+            <a:fillRect/>
+          </a:stretch>
+        </p:blipFill>
+        <p:spPr>
+          <a:xfrm>
+            <a:off x="1477207" y="4891678"/>
+            <a:ext cx="10629531" cy="1051919"/>
+          </a:xfrm>
+          <a:prstGeom prst="rect">
+            <a:avLst/>
+          </a:prstGeom>
+        </p:spPr>
+      </p:pic>
+    </p:spTree>
+    <p:extLst>
+      <p:ext uri="{BB962C8B-B14F-4D97-AF65-F5344CB8AC3E}">
+        <p14:creationId xmlns:p14="http://schemas.microsoft.com/office/powerpoint/2010/main" val="2485924745"/>
       </p:ext>
     </p:extLst>
   </p:cSld>

</xml_diff>

<commit_message>
Update document for azalea
Signed-off-by: Liu Haixiang <haixiang1977@gmail.com>
</commit_message>
<xml_diff>
--- a/Docker architect.pptx
+++ b/Docker architect.pptx
@@ -18,7 +18,12 @@
     <p:sldId id="265" r:id="rId12"/>
     <p:sldId id="266" r:id="rId13"/>
     <p:sldId id="268" r:id="rId14"/>
-    <p:sldId id="269" r:id="rId15"/>
+    <p:sldId id="270" r:id="rId15"/>
+    <p:sldId id="271" r:id="rId16"/>
+    <p:sldId id="272" r:id="rId17"/>
+    <p:sldId id="273" r:id="rId18"/>
+    <p:sldId id="274" r:id="rId19"/>
+    <p:sldId id="269" r:id="rId20"/>
   </p:sldIdLst>
   <p:sldSz cx="12192000" cy="6858000"/>
   <p:notesSz cx="6858000" cy="9144000"/>
@@ -6764,6 +6769,576 @@
           <p:cNvPr id="2" name="Title 1">
             <a:extLst>
               <a:ext uri="{FF2B5EF4-FFF2-40B4-BE49-F238E27FC236}">
+                <a16:creationId xmlns:a16="http://schemas.microsoft.com/office/drawing/2014/main" id="{065AC865-972A-4C81-8A80-B2BD50FBAF8C}"/>
+              </a:ext>
+            </a:extLst>
+          </p:cNvPr>
+          <p:cNvSpPr>
+            <a:spLocks noGrp="1"/>
+          </p:cNvSpPr>
+          <p:nvPr>
+            <p:ph type="title"/>
+          </p:nvPr>
+        </p:nvSpPr>
+        <p:spPr/>
+        <p:txBody>
+          <a:bodyPr/>
+          <a:lstStyle/>
+          <a:p>
+            <a:r>
+              <a:rPr lang="en-US" dirty="0"/>
+              <a:t>AZALEA</a:t>
+            </a:r>
+          </a:p>
+        </p:txBody>
+      </p:sp>
+      <p:sp>
+        <p:nvSpPr>
+          <p:cNvPr id="3" name="Content Placeholder 2">
+            <a:extLst>
+              <a:ext uri="{FF2B5EF4-FFF2-40B4-BE49-F238E27FC236}">
+                <a16:creationId xmlns:a16="http://schemas.microsoft.com/office/drawing/2014/main" id="{535DBCC3-A54A-4DB5-8EBB-CFE7893E3F76}"/>
+              </a:ext>
+            </a:extLst>
+          </p:cNvPr>
+          <p:cNvSpPr>
+            <a:spLocks noGrp="1"/>
+          </p:cNvSpPr>
+          <p:nvPr>
+            <p:ph sz="quarter" idx="13"/>
+          </p:nvPr>
+        </p:nvSpPr>
+        <p:spPr/>
+        <p:txBody>
+          <a:bodyPr/>
+          <a:lstStyle/>
+          <a:p>
+            <a:r>
+              <a:rPr lang="en-US" dirty="0"/>
+              <a:t>Git clone </a:t>
+            </a:r>
+            <a:r>
+              <a:rPr lang="en-US" dirty="0">
+                <a:hlinkClick r:id="rId2"/>
+              </a:rPr>
+              <a:t>git@github.com:haixiang1977/</a:t>
+            </a:r>
+            <a:r>
+              <a:rPr lang="en-US" dirty="0" err="1">
+                <a:hlinkClick r:id="rId2"/>
+              </a:rPr>
+              <a:t>azalea.git</a:t>
+            </a:r>
+            <a:endParaRPr lang="en-US" dirty="0"/>
+          </a:p>
+          <a:p>
+            <a:r>
+              <a:rPr lang="en-US" dirty="0"/>
+              <a:t>docker build -t "yiyang2009/azalea:1.1.0" .</a:t>
+            </a:r>
+          </a:p>
+        </p:txBody>
+      </p:sp>
+      <p:pic>
+        <p:nvPicPr>
+          <p:cNvPr id="4" name="Picture 3">
+            <a:extLst>
+              <a:ext uri="{FF2B5EF4-FFF2-40B4-BE49-F238E27FC236}">
+                <a16:creationId xmlns:a16="http://schemas.microsoft.com/office/drawing/2014/main" id="{E2753501-365A-4D88-80EB-AEF18262716A}"/>
+              </a:ext>
+            </a:extLst>
+          </p:cNvPr>
+          <p:cNvPicPr>
+            <a:picLocks noChangeAspect="1"/>
+          </p:cNvPicPr>
+          <p:nvPr/>
+        </p:nvPicPr>
+        <p:blipFill>
+          <a:blip r:embed="rId3"/>
+          <a:stretch>
+            <a:fillRect/>
+          </a:stretch>
+        </p:blipFill>
+        <p:spPr>
+          <a:xfrm>
+            <a:off x="1265946" y="3360152"/>
+            <a:ext cx="5895975" cy="1895475"/>
+          </a:xfrm>
+          <a:prstGeom prst="rect">
+            <a:avLst/>
+          </a:prstGeom>
+        </p:spPr>
+      </p:pic>
+    </p:spTree>
+    <p:extLst>
+      <p:ext uri="{BB962C8B-B14F-4D97-AF65-F5344CB8AC3E}">
+        <p14:creationId xmlns:p14="http://schemas.microsoft.com/office/powerpoint/2010/main" val="3825390073"/>
+      </p:ext>
+    </p:extLst>
+  </p:cSld>
+  <p:clrMapOvr>
+    <a:masterClrMapping/>
+  </p:clrMapOvr>
+</p:sld>
+</file>
+
+<file path=ppt/slides/slide15.xml><?xml version="1.0" encoding="utf-8"?>
+<p:sld xmlns:a="http://schemas.openxmlformats.org/drawingml/2006/main" xmlns:r="http://schemas.openxmlformats.org/officeDocument/2006/relationships" xmlns:p="http://schemas.openxmlformats.org/presentationml/2006/main">
+  <p:cSld>
+    <p:spTree>
+      <p:nvGrpSpPr>
+        <p:cNvPr id="1" name=""/>
+        <p:cNvGrpSpPr/>
+        <p:nvPr/>
+      </p:nvGrpSpPr>
+      <p:grpSpPr>
+        <a:xfrm>
+          <a:off x="0" y="0"/>
+          <a:ext cx="0" cy="0"/>
+          <a:chOff x="0" y="0"/>
+          <a:chExt cx="0" cy="0"/>
+        </a:xfrm>
+      </p:grpSpPr>
+      <p:sp>
+        <p:nvSpPr>
+          <p:cNvPr id="2" name="Title 1">
+            <a:extLst>
+              <a:ext uri="{FF2B5EF4-FFF2-40B4-BE49-F238E27FC236}">
+                <a16:creationId xmlns:a16="http://schemas.microsoft.com/office/drawing/2014/main" id="{89AA510B-D6DA-4FA4-A6F2-B992F4F6FAFA}"/>
+              </a:ext>
+            </a:extLst>
+          </p:cNvPr>
+          <p:cNvSpPr>
+            <a:spLocks noGrp="1"/>
+          </p:cNvSpPr>
+          <p:nvPr>
+            <p:ph type="title"/>
+          </p:nvPr>
+        </p:nvSpPr>
+        <p:spPr/>
+        <p:txBody>
+          <a:bodyPr/>
+          <a:lstStyle/>
+          <a:p>
+            <a:r>
+              <a:rPr lang="en-US" dirty="0"/>
+              <a:t>AZALEA (cont.)</a:t>
+            </a:r>
+          </a:p>
+        </p:txBody>
+      </p:sp>
+      <p:sp>
+        <p:nvSpPr>
+          <p:cNvPr id="3" name="Content Placeholder 2">
+            <a:extLst>
+              <a:ext uri="{FF2B5EF4-FFF2-40B4-BE49-F238E27FC236}">
+                <a16:creationId xmlns:a16="http://schemas.microsoft.com/office/drawing/2014/main" id="{984DECF2-C4CC-4A8A-9680-D94E5641D277}"/>
+              </a:ext>
+            </a:extLst>
+          </p:cNvPr>
+          <p:cNvSpPr>
+            <a:spLocks noGrp="1"/>
+          </p:cNvSpPr>
+          <p:nvPr>
+            <p:ph sz="quarter" idx="13"/>
+          </p:nvPr>
+        </p:nvSpPr>
+        <p:spPr/>
+        <p:txBody>
+          <a:bodyPr/>
+          <a:lstStyle/>
+          <a:p>
+            <a:endParaRPr lang="en-US" dirty="0"/>
+          </a:p>
+        </p:txBody>
+      </p:sp>
+      <p:pic>
+        <p:nvPicPr>
+          <p:cNvPr id="4" name="Picture 3">
+            <a:extLst>
+              <a:ext uri="{FF2B5EF4-FFF2-40B4-BE49-F238E27FC236}">
+                <a16:creationId xmlns:a16="http://schemas.microsoft.com/office/drawing/2014/main" id="{11BBED8A-CC54-4299-B54E-D24C81CA6049}"/>
+              </a:ext>
+            </a:extLst>
+          </p:cNvPr>
+          <p:cNvPicPr>
+            <a:picLocks noChangeAspect="1"/>
+          </p:cNvPicPr>
+          <p:nvPr/>
+        </p:nvPicPr>
+        <p:blipFill>
+          <a:blip r:embed="rId2"/>
+          <a:stretch>
+            <a:fillRect/>
+          </a:stretch>
+        </p:blipFill>
+        <p:spPr>
+          <a:xfrm>
+            <a:off x="913774" y="2367092"/>
+            <a:ext cx="8477250" cy="1771650"/>
+          </a:xfrm>
+          <a:prstGeom prst="rect">
+            <a:avLst/>
+          </a:prstGeom>
+        </p:spPr>
+      </p:pic>
+    </p:spTree>
+    <p:extLst>
+      <p:ext uri="{BB962C8B-B14F-4D97-AF65-F5344CB8AC3E}">
+        <p14:creationId xmlns:p14="http://schemas.microsoft.com/office/powerpoint/2010/main" val="605062484"/>
+      </p:ext>
+    </p:extLst>
+  </p:cSld>
+  <p:clrMapOvr>
+    <a:masterClrMapping/>
+  </p:clrMapOvr>
+</p:sld>
+</file>
+
+<file path=ppt/slides/slide16.xml><?xml version="1.0" encoding="utf-8"?>
+<p:sld xmlns:a="http://schemas.openxmlformats.org/drawingml/2006/main" xmlns:r="http://schemas.openxmlformats.org/officeDocument/2006/relationships" xmlns:p="http://schemas.openxmlformats.org/presentationml/2006/main">
+  <p:cSld>
+    <p:spTree>
+      <p:nvGrpSpPr>
+        <p:cNvPr id="1" name=""/>
+        <p:cNvGrpSpPr/>
+        <p:nvPr/>
+      </p:nvGrpSpPr>
+      <p:grpSpPr>
+        <a:xfrm>
+          <a:off x="0" y="0"/>
+          <a:ext cx="0" cy="0"/>
+          <a:chOff x="0" y="0"/>
+          <a:chExt cx="0" cy="0"/>
+        </a:xfrm>
+      </p:grpSpPr>
+      <p:sp>
+        <p:nvSpPr>
+          <p:cNvPr id="2" name="Title 1">
+            <a:extLst>
+              <a:ext uri="{FF2B5EF4-FFF2-40B4-BE49-F238E27FC236}">
+                <a16:creationId xmlns:a16="http://schemas.microsoft.com/office/drawing/2014/main" id="{37B65648-BDB6-4166-9189-D30C2931C1D5}"/>
+              </a:ext>
+            </a:extLst>
+          </p:cNvPr>
+          <p:cNvSpPr>
+            <a:spLocks noGrp="1"/>
+          </p:cNvSpPr>
+          <p:nvPr>
+            <p:ph type="title"/>
+          </p:nvPr>
+        </p:nvSpPr>
+        <p:spPr/>
+        <p:txBody>
+          <a:bodyPr/>
+          <a:lstStyle/>
+          <a:p>
+            <a:r>
+              <a:rPr lang="en-US" dirty="0"/>
+              <a:t>AZALEA (cont.)</a:t>
+            </a:r>
+          </a:p>
+        </p:txBody>
+      </p:sp>
+      <p:sp>
+        <p:nvSpPr>
+          <p:cNvPr id="3" name="Content Placeholder 2">
+            <a:extLst>
+              <a:ext uri="{FF2B5EF4-FFF2-40B4-BE49-F238E27FC236}">
+                <a16:creationId xmlns:a16="http://schemas.microsoft.com/office/drawing/2014/main" id="{96A5384F-BD9C-4BAC-B992-EC2E24F795EB}"/>
+              </a:ext>
+            </a:extLst>
+          </p:cNvPr>
+          <p:cNvSpPr>
+            <a:spLocks noGrp="1"/>
+          </p:cNvSpPr>
+          <p:nvPr>
+            <p:ph sz="quarter" idx="13"/>
+          </p:nvPr>
+        </p:nvSpPr>
+        <p:spPr/>
+        <p:txBody>
+          <a:bodyPr/>
+          <a:lstStyle/>
+          <a:p>
+            <a:r>
+              <a:rPr lang="en-US" dirty="0"/>
+              <a:t>Run image and link to petunia container and export 8080 to host</a:t>
+            </a:r>
+          </a:p>
+          <a:p>
+            <a:pPr lvl="1"/>
+            <a:r>
+              <a:rPr lang="en-US" dirty="0"/>
+              <a:t>docker run -p 8080:8080 --name azalea --link petunia yiyang2009/azalea:1.1.0</a:t>
+            </a:r>
+          </a:p>
+        </p:txBody>
+      </p:sp>
+      <p:pic>
+        <p:nvPicPr>
+          <p:cNvPr id="4" name="Picture 3">
+            <a:extLst>
+              <a:ext uri="{FF2B5EF4-FFF2-40B4-BE49-F238E27FC236}">
+                <a16:creationId xmlns:a16="http://schemas.microsoft.com/office/drawing/2014/main" id="{E53E3C0F-6C91-4595-8ADA-E1054D3A2BE2}"/>
+              </a:ext>
+            </a:extLst>
+          </p:cNvPr>
+          <p:cNvPicPr>
+            <a:picLocks noChangeAspect="1"/>
+          </p:cNvPicPr>
+          <p:nvPr/>
+        </p:nvPicPr>
+        <p:blipFill>
+          <a:blip r:embed="rId2"/>
+          <a:stretch>
+            <a:fillRect/>
+          </a:stretch>
+        </p:blipFill>
+        <p:spPr>
+          <a:xfrm>
+            <a:off x="492248" y="3279189"/>
+            <a:ext cx="11029950" cy="2057400"/>
+          </a:xfrm>
+          <a:prstGeom prst="rect">
+            <a:avLst/>
+          </a:prstGeom>
+        </p:spPr>
+      </p:pic>
+    </p:spTree>
+    <p:extLst>
+      <p:ext uri="{BB962C8B-B14F-4D97-AF65-F5344CB8AC3E}">
+        <p14:creationId xmlns:p14="http://schemas.microsoft.com/office/powerpoint/2010/main" val="988957389"/>
+      </p:ext>
+    </p:extLst>
+  </p:cSld>
+  <p:clrMapOvr>
+    <a:masterClrMapping/>
+  </p:clrMapOvr>
+</p:sld>
+</file>
+
+<file path=ppt/slides/slide17.xml><?xml version="1.0" encoding="utf-8"?>
+<p:sld xmlns:a="http://schemas.openxmlformats.org/drawingml/2006/main" xmlns:r="http://schemas.openxmlformats.org/officeDocument/2006/relationships" xmlns:p="http://schemas.openxmlformats.org/presentationml/2006/main">
+  <p:cSld>
+    <p:spTree>
+      <p:nvGrpSpPr>
+        <p:cNvPr id="1" name=""/>
+        <p:cNvGrpSpPr/>
+        <p:nvPr/>
+      </p:nvGrpSpPr>
+      <p:grpSpPr>
+        <a:xfrm>
+          <a:off x="0" y="0"/>
+          <a:ext cx="0" cy="0"/>
+          <a:chOff x="0" y="0"/>
+          <a:chExt cx="0" cy="0"/>
+        </a:xfrm>
+      </p:grpSpPr>
+      <p:sp>
+        <p:nvSpPr>
+          <p:cNvPr id="2" name="Title 1">
+            <a:extLst>
+              <a:ext uri="{FF2B5EF4-FFF2-40B4-BE49-F238E27FC236}">
+                <a16:creationId xmlns:a16="http://schemas.microsoft.com/office/drawing/2014/main" id="{49AC2428-9A7A-478C-B70B-779D876F3075}"/>
+              </a:ext>
+            </a:extLst>
+          </p:cNvPr>
+          <p:cNvSpPr>
+            <a:spLocks noGrp="1"/>
+          </p:cNvSpPr>
+          <p:nvPr>
+            <p:ph type="title"/>
+          </p:nvPr>
+        </p:nvSpPr>
+        <p:spPr/>
+        <p:txBody>
+          <a:bodyPr/>
+          <a:lstStyle/>
+          <a:p>
+            <a:r>
+              <a:rPr lang="en-US" dirty="0"/>
+              <a:t>AZALEA (cont.)</a:t>
+            </a:r>
+          </a:p>
+        </p:txBody>
+      </p:sp>
+      <p:sp>
+        <p:nvSpPr>
+          <p:cNvPr id="3" name="Content Placeholder 2">
+            <a:extLst>
+              <a:ext uri="{FF2B5EF4-FFF2-40B4-BE49-F238E27FC236}">
+                <a16:creationId xmlns:a16="http://schemas.microsoft.com/office/drawing/2014/main" id="{163A4221-ABE6-440F-94B8-AA9577D4E192}"/>
+              </a:ext>
+            </a:extLst>
+          </p:cNvPr>
+          <p:cNvSpPr>
+            <a:spLocks noGrp="1"/>
+          </p:cNvSpPr>
+          <p:nvPr>
+            <p:ph sz="quarter" idx="13"/>
+          </p:nvPr>
+        </p:nvSpPr>
+        <p:spPr/>
+        <p:txBody>
+          <a:bodyPr/>
+          <a:lstStyle/>
+          <a:p>
+            <a:r>
+              <a:rPr lang="en-US" dirty="0"/>
+              <a:t>127.0.0.1:8080</a:t>
+            </a:r>
+          </a:p>
+        </p:txBody>
+      </p:sp>
+      <p:pic>
+        <p:nvPicPr>
+          <p:cNvPr id="4" name="Picture 3">
+            <a:extLst>
+              <a:ext uri="{FF2B5EF4-FFF2-40B4-BE49-F238E27FC236}">
+                <a16:creationId xmlns:a16="http://schemas.microsoft.com/office/drawing/2014/main" id="{E3916CF6-FE47-4C8B-BD36-B1C7DF34D449}"/>
+              </a:ext>
+            </a:extLst>
+          </p:cNvPr>
+          <p:cNvPicPr>
+            <a:picLocks noChangeAspect="1"/>
+          </p:cNvPicPr>
+          <p:nvPr/>
+        </p:nvPicPr>
+        <p:blipFill>
+          <a:blip r:embed="rId2"/>
+          <a:stretch>
+            <a:fillRect/>
+          </a:stretch>
+        </p:blipFill>
+        <p:spPr>
+          <a:xfrm>
+            <a:off x="1038061" y="2839087"/>
+            <a:ext cx="10382322" cy="2480116"/>
+          </a:xfrm>
+          <a:prstGeom prst="rect">
+            <a:avLst/>
+          </a:prstGeom>
+        </p:spPr>
+      </p:pic>
+    </p:spTree>
+    <p:extLst>
+      <p:ext uri="{BB962C8B-B14F-4D97-AF65-F5344CB8AC3E}">
+        <p14:creationId xmlns:p14="http://schemas.microsoft.com/office/powerpoint/2010/main" val="2743642122"/>
+      </p:ext>
+    </p:extLst>
+  </p:cSld>
+  <p:clrMapOvr>
+    <a:masterClrMapping/>
+  </p:clrMapOvr>
+</p:sld>
+</file>
+
+<file path=ppt/slides/slide18.xml><?xml version="1.0" encoding="utf-8"?>
+<p:sld xmlns:a="http://schemas.openxmlformats.org/drawingml/2006/main" xmlns:r="http://schemas.openxmlformats.org/officeDocument/2006/relationships" xmlns:p="http://schemas.openxmlformats.org/presentationml/2006/main">
+  <p:cSld>
+    <p:spTree>
+      <p:nvGrpSpPr>
+        <p:cNvPr id="1" name=""/>
+        <p:cNvGrpSpPr/>
+        <p:nvPr/>
+      </p:nvGrpSpPr>
+      <p:grpSpPr>
+        <a:xfrm>
+          <a:off x="0" y="0"/>
+          <a:ext cx="0" cy="0"/>
+          <a:chOff x="0" y="0"/>
+          <a:chExt cx="0" cy="0"/>
+        </a:xfrm>
+      </p:grpSpPr>
+      <p:sp>
+        <p:nvSpPr>
+          <p:cNvPr id="2" name="Title 1">
+            <a:extLst>
+              <a:ext uri="{FF2B5EF4-FFF2-40B4-BE49-F238E27FC236}">
+                <a16:creationId xmlns:a16="http://schemas.microsoft.com/office/drawing/2014/main" id="{E20ADF86-7C8B-48EE-83E8-832DB213324A}"/>
+              </a:ext>
+            </a:extLst>
+          </p:cNvPr>
+          <p:cNvSpPr>
+            <a:spLocks noGrp="1"/>
+          </p:cNvSpPr>
+          <p:nvPr>
+            <p:ph type="title"/>
+          </p:nvPr>
+        </p:nvSpPr>
+        <p:spPr/>
+        <p:txBody>
+          <a:bodyPr/>
+          <a:lstStyle/>
+          <a:p>
+            <a:r>
+              <a:rPr lang="en-US"/>
+              <a:t>Docker compose</a:t>
+            </a:r>
+          </a:p>
+        </p:txBody>
+      </p:sp>
+      <p:sp>
+        <p:nvSpPr>
+          <p:cNvPr id="3" name="Content Placeholder 2">
+            <a:extLst>
+              <a:ext uri="{FF2B5EF4-FFF2-40B4-BE49-F238E27FC236}">
+                <a16:creationId xmlns:a16="http://schemas.microsoft.com/office/drawing/2014/main" id="{BBB3E48C-70A0-448A-B6F0-98E0C20F14CD}"/>
+              </a:ext>
+            </a:extLst>
+          </p:cNvPr>
+          <p:cNvSpPr>
+            <a:spLocks noGrp="1"/>
+          </p:cNvSpPr>
+          <p:nvPr>
+            <p:ph sz="quarter" idx="13"/>
+          </p:nvPr>
+        </p:nvSpPr>
+        <p:spPr/>
+        <p:txBody>
+          <a:bodyPr/>
+          <a:lstStyle/>
+          <a:p>
+            <a:endParaRPr lang="en-US"/>
+          </a:p>
+        </p:txBody>
+      </p:sp>
+    </p:spTree>
+    <p:extLst>
+      <p:ext uri="{BB962C8B-B14F-4D97-AF65-F5344CB8AC3E}">
+        <p14:creationId xmlns:p14="http://schemas.microsoft.com/office/powerpoint/2010/main" val="2514281608"/>
+      </p:ext>
+    </p:extLst>
+  </p:cSld>
+  <p:clrMapOvr>
+    <a:masterClrMapping/>
+  </p:clrMapOvr>
+</p:sld>
+</file>
+
+<file path=ppt/slides/slide19.xml><?xml version="1.0" encoding="utf-8"?>
+<p:sld xmlns:a="http://schemas.openxmlformats.org/drawingml/2006/main" xmlns:r="http://schemas.openxmlformats.org/officeDocument/2006/relationships" xmlns:p="http://schemas.openxmlformats.org/presentationml/2006/main">
+  <p:cSld>
+    <p:spTree>
+      <p:nvGrpSpPr>
+        <p:cNvPr id="1" name=""/>
+        <p:cNvGrpSpPr/>
+        <p:nvPr/>
+      </p:nvGrpSpPr>
+      <p:grpSpPr>
+        <a:xfrm>
+          <a:off x="0" y="0"/>
+          <a:ext cx="0" cy="0"/>
+          <a:chOff x="0" y="0"/>
+          <a:chExt cx="0" cy="0"/>
+        </a:xfrm>
+      </p:grpSpPr>
+      <p:sp>
+        <p:nvSpPr>
+          <p:cNvPr id="2" name="Title 1">
+            <a:extLst>
+              <a:ext uri="{FF2B5EF4-FFF2-40B4-BE49-F238E27FC236}">
                 <a16:creationId xmlns:a16="http://schemas.microsoft.com/office/drawing/2014/main" id="{A4BB8E96-EA5C-40B0-967E-6D3BAD2BA525}"/>
               </a:ext>
             </a:extLst>
@@ -6781,7 +7356,7 @@
           <a:lstStyle/>
           <a:p>
             <a:r>
-              <a:rPr lang="en-US"/>
+              <a:rPr lang="en-US" dirty="0"/>
               <a:t>END</a:t>
             </a:r>
           </a:p>

</xml_diff>